<commit_message>
change color style to grey, add autoplay button
</commit_message>
<xml_diff>
--- a/src/penny.pptx
+++ b/src/penny.pptx
@@ -6,6 +6,7 @@
   </p:sldMasterIdLst>
   <p:sldIdLst>
     <p:sldId id="256" r:id="rId2"/>
+    <p:sldId id="257" r:id="rId3"/>
   </p:sldIdLst>
   <p:sldSz cx="9144000" cy="6858000" type="screen4x3"/>
   <p:notesSz cx="6858000" cy="9144000"/>
@@ -289,7 +290,7 @@
             <a:fld id="{E2F55664-3344-4F5C-9F4E-979465A29E0C}" type="datetimeFigureOut">
               <a:rPr lang="zh-TW" altLang="en-US" smtClean="0"/>
               <a:pPr/>
-              <a:t>2011/10/12</a:t>
+              <a:t>2011/10/13</a:t>
             </a:fld>
             <a:endParaRPr lang="zh-TW" altLang="en-US"/>
           </a:p>
@@ -456,7 +457,7 @@
             <a:fld id="{E2F55664-3344-4F5C-9F4E-979465A29E0C}" type="datetimeFigureOut">
               <a:rPr lang="zh-TW" altLang="en-US" smtClean="0"/>
               <a:pPr/>
-              <a:t>2011/10/12</a:t>
+              <a:t>2011/10/13</a:t>
             </a:fld>
             <a:endParaRPr lang="zh-TW" altLang="en-US"/>
           </a:p>
@@ -633,7 +634,7 @@
             <a:fld id="{E2F55664-3344-4F5C-9F4E-979465A29E0C}" type="datetimeFigureOut">
               <a:rPr lang="zh-TW" altLang="en-US" smtClean="0"/>
               <a:pPr/>
-              <a:t>2011/10/12</a:t>
+              <a:t>2011/10/13</a:t>
             </a:fld>
             <a:endParaRPr lang="zh-TW" altLang="en-US"/>
           </a:p>
@@ -800,7 +801,7 @@
             <a:fld id="{E2F55664-3344-4F5C-9F4E-979465A29E0C}" type="datetimeFigureOut">
               <a:rPr lang="zh-TW" altLang="en-US" smtClean="0"/>
               <a:pPr/>
-              <a:t>2011/10/12</a:t>
+              <a:t>2011/10/13</a:t>
             </a:fld>
             <a:endParaRPr lang="zh-TW" altLang="en-US"/>
           </a:p>
@@ -1043,7 +1044,7 @@
             <a:fld id="{E2F55664-3344-4F5C-9F4E-979465A29E0C}" type="datetimeFigureOut">
               <a:rPr lang="zh-TW" altLang="en-US" smtClean="0"/>
               <a:pPr/>
-              <a:t>2011/10/12</a:t>
+              <a:t>2011/10/13</a:t>
             </a:fld>
             <a:endParaRPr lang="zh-TW" altLang="en-US"/>
           </a:p>
@@ -1328,7 +1329,7 @@
             <a:fld id="{E2F55664-3344-4F5C-9F4E-979465A29E0C}" type="datetimeFigureOut">
               <a:rPr lang="zh-TW" altLang="en-US" smtClean="0"/>
               <a:pPr/>
-              <a:t>2011/10/12</a:t>
+              <a:t>2011/10/13</a:t>
             </a:fld>
             <a:endParaRPr lang="zh-TW" altLang="en-US"/>
           </a:p>
@@ -1747,7 +1748,7 @@
             <a:fld id="{E2F55664-3344-4F5C-9F4E-979465A29E0C}" type="datetimeFigureOut">
               <a:rPr lang="zh-TW" altLang="en-US" smtClean="0"/>
               <a:pPr/>
-              <a:t>2011/10/12</a:t>
+              <a:t>2011/10/13</a:t>
             </a:fld>
             <a:endParaRPr lang="zh-TW" altLang="en-US"/>
           </a:p>
@@ -1862,7 +1863,7 @@
             <a:fld id="{E2F55664-3344-4F5C-9F4E-979465A29E0C}" type="datetimeFigureOut">
               <a:rPr lang="zh-TW" altLang="en-US" smtClean="0"/>
               <a:pPr/>
-              <a:t>2011/10/12</a:t>
+              <a:t>2011/10/13</a:t>
             </a:fld>
             <a:endParaRPr lang="zh-TW" altLang="en-US"/>
           </a:p>
@@ -1954,7 +1955,7 @@
             <a:fld id="{E2F55664-3344-4F5C-9F4E-979465A29E0C}" type="datetimeFigureOut">
               <a:rPr lang="zh-TW" altLang="en-US" smtClean="0"/>
               <a:pPr/>
-              <a:t>2011/10/12</a:t>
+              <a:t>2011/10/13</a:t>
             </a:fld>
             <a:endParaRPr lang="zh-TW" altLang="en-US"/>
           </a:p>
@@ -2228,7 +2229,7 @@
             <a:fld id="{E2F55664-3344-4F5C-9F4E-979465A29E0C}" type="datetimeFigureOut">
               <a:rPr lang="zh-TW" altLang="en-US" smtClean="0"/>
               <a:pPr/>
-              <a:t>2011/10/12</a:t>
+              <a:t>2011/10/13</a:t>
             </a:fld>
             <a:endParaRPr lang="zh-TW" altLang="en-US"/>
           </a:p>
@@ -2478,7 +2479,7 @@
             <a:fld id="{E2F55664-3344-4F5C-9F4E-979465A29E0C}" type="datetimeFigureOut">
               <a:rPr lang="zh-TW" altLang="en-US" smtClean="0"/>
               <a:pPr/>
-              <a:t>2011/10/12</a:t>
+              <a:t>2011/10/13</a:t>
             </a:fld>
             <a:endParaRPr lang="zh-TW" altLang="en-US"/>
           </a:p>
@@ -2688,7 +2689,7 @@
             <a:fld id="{E2F55664-3344-4F5C-9F4E-979465A29E0C}" type="datetimeFigureOut">
               <a:rPr lang="zh-TW" altLang="en-US" smtClean="0"/>
               <a:pPr/>
-              <a:t>2011/10/12</a:t>
+              <a:t>2011/10/13</a:t>
             </a:fld>
             <a:endParaRPr lang="zh-TW" altLang="en-US"/>
           </a:p>
@@ -3336,8 +3337,8 @@
           </a:xfrm>
           <a:prstGeom prst="wedgeRoundRectCallout">
             <a:avLst>
-              <a:gd name="adj1" fmla="val 61320"/>
-              <a:gd name="adj2" fmla="val 22399"/>
+              <a:gd name="adj1" fmla="val 44016"/>
+              <a:gd name="adj2" fmla="val 32919"/>
               <a:gd name="adj3" fmla="val 16667"/>
             </a:avLst>
           </a:prstGeom>
@@ -3392,7 +3393,7 @@
           <a:p>
             <a:pPr algn="ctr"/>
             <a:r>
-              <a:rPr lang="zh-TW" altLang="en-US" sz="4000" dirty="0" smtClean="0">
+              <a:rPr lang="zh-TW" altLang="en-US" sz="4000" b="1" dirty="0" smtClean="0">
                 <a:ln w="18415" cmpd="sng">
                   <a:solidFill>
                     <a:srgbClr val="FFFFFF"/>
@@ -3430,8 +3431,8 @@
           </a:xfrm>
           <a:prstGeom prst="wedgeRoundRectCallout">
             <a:avLst>
-              <a:gd name="adj1" fmla="val 61320"/>
-              <a:gd name="adj2" fmla="val 22399"/>
+              <a:gd name="adj1" fmla="val 42341"/>
+              <a:gd name="adj2" fmla="val 25405"/>
               <a:gd name="adj3" fmla="val 16667"/>
             </a:avLst>
           </a:prstGeom>
@@ -3486,7 +3487,7 @@
           <a:p>
             <a:pPr algn="ctr"/>
             <a:r>
-              <a:rPr lang="en-US" altLang="zh-TW" sz="4000" dirty="0" smtClean="0">
+              <a:rPr lang="zh-TW" altLang="en-US" sz="4000" b="1" dirty="0" smtClean="0">
                 <a:ln w="18415" cmpd="sng">
                   <a:solidFill>
                     <a:srgbClr val="FFFFFF"/>
@@ -3506,46 +3507,26 @@
                 <a:latin typeface="微軟正黑體" pitchFamily="34" charset="-120"/>
                 <a:ea typeface="微軟正黑體" pitchFamily="34" charset="-120"/>
               </a:rPr>
-              <a:t>BLOG</a:t>
-            </a:r>
-            <a:endParaRPr lang="zh-TW" altLang="en-US" sz="4000" dirty="0" smtClean="0">
-              <a:ln w="18415" cmpd="sng">
-                <a:solidFill>
-                  <a:srgbClr val="FFFFFF"/>
-                </a:solidFill>
-                <a:prstDash val="solid"/>
-              </a:ln>
-              <a:solidFill>
-                <a:srgbClr val="FFFFFF"/>
-              </a:solidFill>
-              <a:effectLst>
-                <a:outerShdw blurRad="63500" dir="3600000" algn="tl" rotWithShape="0">
-                  <a:srgbClr val="000000">
-                    <a:alpha val="70000"/>
-                  </a:srgbClr>
-                </a:outerShdw>
-              </a:effectLst>
-              <a:latin typeface="微軟正黑體" pitchFamily="34" charset="-120"/>
-              <a:ea typeface="微軟正黑體" pitchFamily="34" charset="-120"/>
-            </a:endParaRPr>
-          </a:p>
-        </p:txBody>
-      </p:sp>
-      <p:sp>
-        <p:nvSpPr>
-          <p:cNvPr id="7" name="圓角矩形圖說文字 6"/>
+              <a:t>粉絲專頁</a:t>
+            </a:r>
+          </a:p>
+        </p:txBody>
+      </p:sp>
+      <p:sp>
+        <p:nvSpPr>
+          <p:cNvPr id="12" name="圓角矩形圖說文字 11"/>
           <p:cNvSpPr/>
           <p:nvPr/>
         </p:nvSpPr>
         <p:spPr>
           <a:xfrm>
-            <a:off x="5220072" y="2996952"/>
+            <a:off x="2843808" y="1772816"/>
             <a:ext cx="2520280" cy="936104"/>
           </a:xfrm>
           <a:prstGeom prst="wedgeRoundRectCallout">
             <a:avLst>
-              <a:gd name="adj1" fmla="val 61320"/>
-              <a:gd name="adj2" fmla="val 22399"/>
+              <a:gd name="adj1" fmla="val 42341"/>
+              <a:gd name="adj2" fmla="val 25405"/>
               <a:gd name="adj3" fmla="val 16667"/>
             </a:avLst>
           </a:prstGeom>
@@ -3600,31 +3581,271 @@
           <a:p>
             <a:pPr algn="ctr"/>
             <a:r>
-              <a:rPr lang="zh-TW" altLang="en-US" sz="4000" dirty="0" smtClean="0">
-                <a:ln w="18415" cmpd="sng">
-                  <a:solidFill>
-                    <a:srgbClr val="FFFFFF"/>
-                  </a:solidFill>
-                  <a:prstDash val="solid"/>
-                </a:ln>
+              <a:rPr lang="zh-TW" altLang="en-US" sz="4000" b="1" dirty="0" smtClean="0">
                 <a:solidFill>
-                  <a:srgbClr val="FFFFFF"/>
+                  <a:schemeClr val="bg1"/>
                 </a:solidFill>
-                <a:effectLst>
-                  <a:outerShdw blurRad="63500" dir="3600000" algn="tl" rotWithShape="0">
-                    <a:srgbClr val="000000">
-                      <a:alpha val="70000"/>
-                    </a:srgbClr>
-                  </a:outerShdw>
-                </a:effectLst>
                 <a:latin typeface="微軟正黑體" pitchFamily="34" charset="-120"/>
                 <a:ea typeface="微軟正黑體" pitchFamily="34" charset="-120"/>
               </a:rPr>
-              <a:t>串聯語法</a:t>
-            </a:r>
-          </a:p>
-        </p:txBody>
-      </p:sp>
+              <a:t>自動播放</a:t>
+            </a:r>
+          </a:p>
+        </p:txBody>
+      </p:sp>
+      <p:grpSp>
+        <p:nvGrpSpPr>
+          <p:cNvPr id="17" name="群組 16"/>
+          <p:cNvGrpSpPr/>
+          <p:nvPr/>
+        </p:nvGrpSpPr>
+        <p:grpSpPr>
+          <a:xfrm>
+            <a:off x="5364088" y="2924944"/>
+            <a:ext cx="2520280" cy="1437652"/>
+            <a:chOff x="5364088" y="2924944"/>
+            <a:chExt cx="2520280" cy="1437652"/>
+          </a:xfrm>
+        </p:grpSpPr>
+        <p:sp>
+          <p:nvSpPr>
+            <p:cNvPr id="13" name="圓角矩形圖說文字 12"/>
+            <p:cNvSpPr/>
+            <p:nvPr/>
+          </p:nvSpPr>
+          <p:spPr>
+            <a:xfrm>
+              <a:off x="5364088" y="2924944"/>
+              <a:ext cx="2520280" cy="936104"/>
+            </a:xfrm>
+            <a:prstGeom prst="wedgeRoundRectCallout">
+              <a:avLst>
+                <a:gd name="adj1" fmla="val 42341"/>
+                <a:gd name="adj2" fmla="val 25405"/>
+                <a:gd name="adj3" fmla="val 16667"/>
+              </a:avLst>
+            </a:prstGeom>
+            <a:gradFill>
+              <a:gsLst>
+                <a:gs pos="0">
+                  <a:schemeClr val="bg1">
+                    <a:lumMod val="65000"/>
+                  </a:schemeClr>
+                </a:gs>
+                <a:gs pos="80000">
+                  <a:schemeClr val="bg1">
+                    <a:lumMod val="75000"/>
+                  </a:schemeClr>
+                </a:gs>
+                <a:gs pos="100000">
+                  <a:schemeClr val="bg1">
+                    <a:lumMod val="85000"/>
+                  </a:schemeClr>
+                </a:gs>
+              </a:gsLst>
+              <a:lin ang="16200000" scaled="0"/>
+            </a:gradFill>
+            <a:ln>
+              <a:noFill/>
+            </a:ln>
+            <a:effectLst>
+              <a:outerShdw blurRad="63500" sx="102000" sy="102000" algn="ctr" rotWithShape="0">
+                <a:prstClr val="black">
+                  <a:alpha val="40000"/>
+                </a:prstClr>
+              </a:outerShdw>
+            </a:effectLst>
+          </p:spPr>
+          <p:style>
+            <a:lnRef idx="1">
+              <a:schemeClr val="accent3"/>
+            </a:lnRef>
+            <a:fillRef idx="3">
+              <a:schemeClr val="accent3"/>
+            </a:fillRef>
+            <a:effectRef idx="2">
+              <a:schemeClr val="accent3"/>
+            </a:effectRef>
+            <a:fontRef idx="minor">
+              <a:schemeClr val="lt1"/>
+            </a:fontRef>
+          </p:style>
+          <p:txBody>
+            <a:bodyPr rtlCol="0" anchor="ctr"/>
+            <a:lstStyle/>
+            <a:p>
+              <a:pPr algn="ctr"/>
+              <a:endParaRPr lang="zh-TW" altLang="en-US" sz="4000" b="1" dirty="0" smtClean="0">
+                <a:solidFill>
+                  <a:schemeClr val="bg1">
+                    <a:lumMod val="50000"/>
+                  </a:schemeClr>
+                </a:solidFill>
+                <a:latin typeface="微軟正黑體" pitchFamily="34" charset="-120"/>
+                <a:ea typeface="微軟正黑體" pitchFamily="34" charset="-120"/>
+              </a:endParaRPr>
+            </a:p>
+          </p:txBody>
+        </p:sp>
+        <p:sp>
+          <p:nvSpPr>
+            <p:cNvPr id="15" name="文字方塊 14"/>
+            <p:cNvSpPr txBox="1"/>
+            <p:nvPr/>
+          </p:nvSpPr>
+          <p:spPr>
+            <a:xfrm>
+              <a:off x="5523840" y="3039157"/>
+              <a:ext cx="2288520" cy="1323439"/>
+            </a:xfrm>
+            <a:prstGeom prst="rect">
+              <a:avLst/>
+            </a:prstGeom>
+            <a:noFill/>
+          </p:spPr>
+          <p:txBody>
+            <a:bodyPr wrap="square" rtlCol="0">
+              <a:spAutoFit/>
+            </a:bodyPr>
+            <a:lstStyle/>
+            <a:p>
+              <a:r>
+                <a:rPr lang="zh-TW" altLang="en-US" sz="4000" b="1" dirty="0" smtClean="0">
+                  <a:solidFill>
+                    <a:schemeClr val="bg1">
+                      <a:lumMod val="50000"/>
+                    </a:schemeClr>
+                  </a:solidFill>
+                  <a:latin typeface="微軟正黑體" pitchFamily="34" charset="-120"/>
+                  <a:ea typeface="微軟正黑體" pitchFamily="34" charset="-120"/>
+                </a:rPr>
+                <a:t>自動播放</a:t>
+              </a:r>
+            </a:p>
+            <a:p>
+              <a:endParaRPr lang="zh-TW" altLang="en-US" sz="4000" dirty="0">
+                <a:solidFill>
+                  <a:schemeClr val="bg1">
+                    <a:lumMod val="50000"/>
+                  </a:schemeClr>
+                </a:solidFill>
+              </a:endParaRPr>
+            </a:p>
+          </p:txBody>
+        </p:sp>
+      </p:grpSp>
+    </p:spTree>
+  </p:cSld>
+  <p:clrMapOvr>
+    <a:masterClrMapping/>
+  </p:clrMapOvr>
+</p:sld>
+</file>
+
+<file path=ppt/slides/slide2.xml><?xml version="1.0" encoding="utf-8"?>
+<p:sld xmlns:a="http://schemas.openxmlformats.org/drawingml/2006/main" xmlns:r="http://schemas.openxmlformats.org/officeDocument/2006/relationships" xmlns:p="http://schemas.openxmlformats.org/presentationml/2006/main">
+  <p:cSld>
+    <p:spTree>
+      <p:nvGrpSpPr>
+        <p:cNvPr id="1" name=""/>
+        <p:cNvGrpSpPr/>
+        <p:nvPr/>
+      </p:nvGrpSpPr>
+      <p:grpSpPr>
+        <a:xfrm>
+          <a:off x="0" y="0"/>
+          <a:ext cx="0" cy="0"/>
+          <a:chOff x="0" y="0"/>
+          <a:chExt cx="0" cy="0"/>
+        </a:xfrm>
+      </p:grpSpPr>
+      <p:grpSp>
+        <p:nvGrpSpPr>
+          <p:cNvPr id="7" name="群組 6"/>
+          <p:cNvGrpSpPr/>
+          <p:nvPr/>
+        </p:nvGrpSpPr>
+        <p:grpSpPr>
+          <a:xfrm>
+            <a:off x="-1188640" y="-266700"/>
+            <a:ext cx="12192001" cy="7124700"/>
+            <a:chOff x="-1188640" y="-266700"/>
+            <a:chExt cx="12192001" cy="7124700"/>
+          </a:xfrm>
+        </p:grpSpPr>
+        <p:pic>
+          <p:nvPicPr>
+            <p:cNvPr id="1027" name="Picture 3" descr="C:\Users\johnliu\Desktop\HomerRode.jpg"/>
+            <p:cNvPicPr>
+              <a:picLocks noChangeAspect="1" noChangeArrowheads="1"/>
+            </p:cNvPicPr>
+            <p:nvPr/>
+          </p:nvPicPr>
+          <p:blipFill>
+            <a:blip r:embed="rId2" cstate="print"/>
+            <a:srcRect/>
+            <a:stretch>
+              <a:fillRect/>
+            </a:stretch>
+          </p:blipFill>
+          <p:spPr bwMode="auto">
+            <a:xfrm>
+              <a:off x="-1188640" y="-266700"/>
+              <a:ext cx="12192001" cy="7124700"/>
+            </a:xfrm>
+            <a:prstGeom prst="rect">
+              <a:avLst/>
+            </a:prstGeom>
+            <a:noFill/>
+          </p:spPr>
+        </p:pic>
+        <p:sp>
+          <p:nvSpPr>
+            <p:cNvPr id="6" name="文字方塊 5"/>
+            <p:cNvSpPr txBox="1"/>
+            <p:nvPr/>
+          </p:nvSpPr>
+          <p:spPr>
+            <a:xfrm>
+              <a:off x="0" y="3140968"/>
+              <a:ext cx="615553" cy="2016224"/>
+            </a:xfrm>
+            <a:prstGeom prst="rect">
+              <a:avLst/>
+            </a:prstGeom>
+            <a:noFill/>
+          </p:spPr>
+          <p:txBody>
+            <a:bodyPr vert="eaVert" wrap="square" rtlCol="0">
+              <a:spAutoFit/>
+            </a:bodyPr>
+            <a:lstStyle/>
+            <a:p>
+              <a:r>
+                <a:rPr lang="zh-TW" altLang="en-US" sz="2800" b="1" dirty="0" smtClean="0">
+                  <a:solidFill>
+                    <a:schemeClr val="accent6">
+                      <a:lumMod val="75000"/>
+                    </a:schemeClr>
+                  </a:solidFill>
+                  <a:latin typeface="微軟正黑體" pitchFamily="34" charset="-120"/>
+                  <a:ea typeface="微軟正黑體" pitchFamily="34" charset="-120"/>
+                </a:rPr>
+                <a:t>回家路上</a:t>
+              </a:r>
+              <a:endParaRPr lang="zh-TW" altLang="en-US" sz="2800" b="1" dirty="0">
+                <a:solidFill>
+                  <a:schemeClr val="accent6">
+                    <a:lumMod val="75000"/>
+                  </a:schemeClr>
+                </a:solidFill>
+                <a:latin typeface="微軟正黑體" pitchFamily="34" charset="-120"/>
+                <a:ea typeface="微軟正黑體" pitchFamily="34" charset="-120"/>
+              </a:endParaRPr>
+            </a:p>
+          </p:txBody>
+        </p:sp>
+      </p:grpSp>
     </p:spTree>
   </p:cSld>
   <p:clrMapOvr>

</xml_diff>

<commit_message>
add text to album cover picture
</commit_message>
<xml_diff>
--- a/src/penny.pptx
+++ b/src/penny.pptx
@@ -3768,9 +3768,9 @@
         <p:grpSpPr>
           <a:xfrm>
             <a:off x="-1188640" y="-266700"/>
-            <a:ext cx="12192001" cy="7124700"/>
+            <a:ext cx="12192001" cy="7484740"/>
             <a:chOff x="-1188640" y="-266700"/>
-            <a:chExt cx="12192001" cy="7124700"/>
+            <a:chExt cx="12192001" cy="7484740"/>
           </a:xfrm>
         </p:grpSpPr>
         <p:pic>
@@ -3807,8 +3807,8 @@
           </p:nvSpPr>
           <p:spPr>
             <a:xfrm>
-              <a:off x="0" y="3140968"/>
-              <a:ext cx="615553" cy="2016224"/>
+              <a:off x="87179" y="1268760"/>
+              <a:ext cx="1015663" cy="5949280"/>
             </a:xfrm>
             <a:prstGeom prst="rect">
               <a:avLst/>
@@ -3822,7 +3822,7 @@
             <a:lstStyle/>
             <a:p>
               <a:r>
-                <a:rPr lang="zh-TW" altLang="en-US" sz="2800" b="1" dirty="0" smtClean="0">
+                <a:rPr lang="zh-TW" altLang="en-US" sz="5400" b="1" dirty="0" smtClean="0">
                   <a:solidFill>
                     <a:schemeClr val="accent6">
                       <a:lumMod val="75000"/>
@@ -3831,9 +3831,21 @@
                   <a:latin typeface="微軟正黑體" pitchFamily="34" charset="-120"/>
                   <a:ea typeface="微軟正黑體" pitchFamily="34" charset="-120"/>
                 </a:rPr>
-                <a:t>回家路上</a:t>
+                <a:t>回家</a:t>
               </a:r>
-              <a:endParaRPr lang="zh-TW" altLang="en-US" sz="2800" b="1" dirty="0">
+              <a:r>
+                <a:rPr lang="zh-TW" altLang="en-US" sz="5400" b="1" dirty="0" smtClean="0">
+                  <a:solidFill>
+                    <a:schemeClr val="accent6">
+                      <a:lumMod val="75000"/>
+                    </a:schemeClr>
+                  </a:solidFill>
+                  <a:latin typeface="微軟正黑體" pitchFamily="34" charset="-120"/>
+                  <a:ea typeface="微軟正黑體" pitchFamily="34" charset="-120"/>
+                </a:rPr>
+                <a:t>路上   戴佩妮</a:t>
+              </a:r>
+              <a:endParaRPr lang="zh-TW" altLang="en-US" sz="5400" b="1" dirty="0">
                 <a:solidFill>
                   <a:schemeClr val="accent6">
                     <a:lumMod val="75000"/>

</xml_diff>